<commit_message>
ppt updated, bug fixed
</commit_message>
<xml_diff>
--- a/presentation_v4.pptx
+++ b/presentation_v4.pptx
@@ -285,7 +285,7 @@
           <a:p>
             <a:fld id="{264AD1EF-AD7A-4365-8A64-37BB2D6C6777}" type="datetimeFigureOut">
               <a:rPr lang="en-US" smtClean="0"/>
-              <a:t>4/21/2014</a:t>
+              <a:t>4/22/2014</a:t>
             </a:fld>
             <a:endParaRPr lang="en-US"/>
           </a:p>
@@ -455,7 +455,7 @@
           <a:p>
             <a:fld id="{264AD1EF-AD7A-4365-8A64-37BB2D6C6777}" type="datetimeFigureOut">
               <a:rPr lang="en-US" smtClean="0"/>
-              <a:t>4/21/2014</a:t>
+              <a:t>4/22/2014</a:t>
             </a:fld>
             <a:endParaRPr lang="en-US"/>
           </a:p>
@@ -635,7 +635,7 @@
           <a:p>
             <a:fld id="{264AD1EF-AD7A-4365-8A64-37BB2D6C6777}" type="datetimeFigureOut">
               <a:rPr lang="en-US" smtClean="0"/>
-              <a:t>4/21/2014</a:t>
+              <a:t>4/22/2014</a:t>
             </a:fld>
             <a:endParaRPr lang="en-US"/>
           </a:p>
@@ -805,7 +805,7 @@
           <a:p>
             <a:fld id="{264AD1EF-AD7A-4365-8A64-37BB2D6C6777}" type="datetimeFigureOut">
               <a:rPr lang="en-US" smtClean="0"/>
-              <a:t>4/21/2014</a:t>
+              <a:t>4/22/2014</a:t>
             </a:fld>
             <a:endParaRPr lang="en-US"/>
           </a:p>
@@ -1051,7 +1051,7 @@
           <a:p>
             <a:fld id="{264AD1EF-AD7A-4365-8A64-37BB2D6C6777}" type="datetimeFigureOut">
               <a:rPr lang="en-US" smtClean="0"/>
-              <a:t>4/21/2014</a:t>
+              <a:t>4/22/2014</a:t>
             </a:fld>
             <a:endParaRPr lang="en-US"/>
           </a:p>
@@ -1283,7 +1283,7 @@
           <a:p>
             <a:fld id="{264AD1EF-AD7A-4365-8A64-37BB2D6C6777}" type="datetimeFigureOut">
               <a:rPr lang="en-US" smtClean="0"/>
-              <a:t>4/21/2014</a:t>
+              <a:t>4/22/2014</a:t>
             </a:fld>
             <a:endParaRPr lang="en-US"/>
           </a:p>
@@ -1650,7 +1650,7 @@
           <a:p>
             <a:fld id="{264AD1EF-AD7A-4365-8A64-37BB2D6C6777}" type="datetimeFigureOut">
               <a:rPr lang="en-US" smtClean="0"/>
-              <a:t>4/21/2014</a:t>
+              <a:t>4/22/2014</a:t>
             </a:fld>
             <a:endParaRPr lang="en-US"/>
           </a:p>
@@ -1768,7 +1768,7 @@
           <a:p>
             <a:fld id="{264AD1EF-AD7A-4365-8A64-37BB2D6C6777}" type="datetimeFigureOut">
               <a:rPr lang="en-US" smtClean="0"/>
-              <a:t>4/21/2014</a:t>
+              <a:t>4/22/2014</a:t>
             </a:fld>
             <a:endParaRPr lang="en-US"/>
           </a:p>
@@ -1863,7 +1863,7 @@
           <a:p>
             <a:fld id="{264AD1EF-AD7A-4365-8A64-37BB2D6C6777}" type="datetimeFigureOut">
               <a:rPr lang="en-US" smtClean="0"/>
-              <a:t>4/21/2014</a:t>
+              <a:t>4/22/2014</a:t>
             </a:fld>
             <a:endParaRPr lang="en-US"/>
           </a:p>
@@ -2140,7 +2140,7 @@
           <a:p>
             <a:fld id="{264AD1EF-AD7A-4365-8A64-37BB2D6C6777}" type="datetimeFigureOut">
               <a:rPr lang="en-US" smtClean="0"/>
-              <a:t>4/21/2014</a:t>
+              <a:t>4/22/2014</a:t>
             </a:fld>
             <a:endParaRPr lang="en-US"/>
           </a:p>
@@ -2393,7 +2393,7 @@
           <a:p>
             <a:fld id="{264AD1EF-AD7A-4365-8A64-37BB2D6C6777}" type="datetimeFigureOut">
               <a:rPr lang="en-US" smtClean="0"/>
-              <a:t>4/21/2014</a:t>
+              <a:t>4/22/2014</a:t>
             </a:fld>
             <a:endParaRPr lang="en-US"/>
           </a:p>
@@ -2606,7 +2606,7 @@
           <a:p>
             <a:fld id="{264AD1EF-AD7A-4365-8A64-37BB2D6C6777}" type="datetimeFigureOut">
               <a:rPr lang="en-US" smtClean="0"/>
-              <a:t>4/21/2014</a:t>
+              <a:t>4/22/2014</a:t>
             </a:fld>
             <a:endParaRPr lang="en-US"/>
           </a:p>
@@ -3096,14 +3096,12 @@
               <a:rPr lang="en-US" dirty="0" smtClean="0"/>
               <a:t> Wang </a:t>
             </a:r>
-            <a:endParaRPr lang="en-US" dirty="0" smtClean="0"/>
           </a:p>
           <a:p>
             <a:r>
               <a:rPr lang="en-US" dirty="0" smtClean="0"/>
               <a:t>Lei Chen</a:t>
             </a:r>
-            <a:endParaRPr lang="en-US" dirty="0" smtClean="0"/>
           </a:p>
           <a:p>
             <a:r>
@@ -3114,7 +3112,6 @@
               <a:rPr lang="en-US" dirty="0" smtClean="0"/>
               <a:t> Tiwari</a:t>
             </a:r>
-            <a:endParaRPr lang="en-US" dirty="0" smtClean="0"/>
           </a:p>
           <a:p>
             <a:r>
@@ -9697,6 +9694,33 @@
                                   </p:childTnLst>
                                 </p:cTn>
                               </p:par>
+                              <p:par>
+                                <p:cTn id="23" presetID="1" presetClass="entr" presetSubtype="0" fill="hold" grpId="0" nodeType="withEffect">
+                                  <p:stCondLst>
+                                    <p:cond delay="0"/>
+                                  </p:stCondLst>
+                                  <p:childTnLst>
+                                    <p:set>
+                                      <p:cBhvr>
+                                        <p:cTn id="24" dur="1" fill="hold">
+                                          <p:stCondLst>
+                                            <p:cond delay="0"/>
+                                          </p:stCondLst>
+                                        </p:cTn>
+                                        <p:tgtEl>
+                                          <p:spTgt spid="43"/>
+                                        </p:tgtEl>
+                                        <p:attrNameLst>
+                                          <p:attrName>style.visibility</p:attrName>
+                                        </p:attrNameLst>
+                                      </p:cBhvr>
+                                      <p:to>
+                                        <p:strVal val="visible"/>
+                                      </p:to>
+                                    </p:set>
+                                  </p:childTnLst>
+                                </p:cTn>
+                              </p:par>
                             </p:childTnLst>
                           </p:cTn>
                         </p:par>
@@ -9704,26 +9728,26 @@
                     </p:cTn>
                   </p:par>
                   <p:par>
-                    <p:cTn id="23" fill="hold">
+                    <p:cTn id="25" fill="hold">
                       <p:stCondLst>
                         <p:cond delay="indefinite"/>
                       </p:stCondLst>
                       <p:childTnLst>
                         <p:par>
-                          <p:cTn id="24" fill="hold">
+                          <p:cTn id="26" fill="hold">
                             <p:stCondLst>
                               <p:cond delay="0"/>
                             </p:stCondLst>
                             <p:childTnLst>
                               <p:par>
-                                <p:cTn id="25" presetID="1" presetClass="entr" presetSubtype="0" fill="hold" nodeType="clickEffect">
+                                <p:cTn id="27" presetID="1" presetClass="entr" presetSubtype="0" fill="hold" nodeType="clickEffect">
                                   <p:stCondLst>
                                     <p:cond delay="0"/>
                                   </p:stCondLst>
                                   <p:childTnLst>
                                     <p:set>
                                       <p:cBhvr>
-                                        <p:cTn id="26" dur="1" fill="hold">
+                                        <p:cTn id="28" dur="1" fill="hold">
                                           <p:stCondLst>
                                             <p:cond delay="0"/>
                                           </p:stCondLst>
@@ -9749,26 +9773,26 @@
                     </p:cTn>
                   </p:par>
                   <p:par>
-                    <p:cTn id="27" fill="hold">
+                    <p:cTn id="29" fill="hold">
                       <p:stCondLst>
                         <p:cond delay="indefinite"/>
                       </p:stCondLst>
                       <p:childTnLst>
                         <p:par>
-                          <p:cTn id="28" fill="hold">
+                          <p:cTn id="30" fill="hold">
                             <p:stCondLst>
                               <p:cond delay="0"/>
                             </p:stCondLst>
                             <p:childTnLst>
                               <p:par>
-                                <p:cTn id="29" presetID="1" presetClass="entr" presetSubtype="0" fill="hold" grpId="0" nodeType="clickEffect">
+                                <p:cTn id="31" presetID="1" presetClass="entr" presetSubtype="0" fill="hold" grpId="0" nodeType="clickEffect">
                                   <p:stCondLst>
                                     <p:cond delay="0"/>
                                   </p:stCondLst>
                                   <p:childTnLst>
                                     <p:set>
                                       <p:cBhvr>
-                                        <p:cTn id="30" dur="1" fill="hold">
+                                        <p:cTn id="32" dur="1" fill="hold">
                                           <p:stCondLst>
                                             <p:cond delay="0"/>
                                           </p:stCondLst>
@@ -9787,26 +9811,8 @@
                                   </p:childTnLst>
                                 </p:cTn>
                               </p:par>
-                            </p:childTnLst>
-                          </p:cTn>
-                        </p:par>
-                      </p:childTnLst>
-                    </p:cTn>
-                  </p:par>
-                  <p:par>
-                    <p:cTn id="31" fill="hold">
-                      <p:stCondLst>
-                        <p:cond delay="indefinite"/>
-                      </p:stCondLst>
-                      <p:childTnLst>
-                        <p:par>
-                          <p:cTn id="32" fill="hold">
-                            <p:stCondLst>
-                              <p:cond delay="0"/>
-                            </p:stCondLst>
-                            <p:childTnLst>
                               <p:par>
-                                <p:cTn id="33" presetID="1" presetClass="entr" presetSubtype="0" fill="hold" nodeType="clickEffect">
+                                <p:cTn id="33" presetID="1" presetClass="entr" presetSubtype="0" fill="hold" grpId="0" nodeType="withEffect">
                                   <p:stCondLst>
                                     <p:cond delay="0"/>
                                   </p:stCondLst>
@@ -9819,7 +9825,7 @@
                                           </p:stCondLst>
                                         </p:cTn>
                                         <p:tgtEl>
-                                          <p:spTgt spid="38"/>
+                                          <p:spTgt spid="44"/>
                                         </p:tgtEl>
                                         <p:attrNameLst>
                                           <p:attrName>style.visibility</p:attrName>
@@ -9864,7 +9870,7 @@
                                           </p:stCondLst>
                                         </p:cTn>
                                         <p:tgtEl>
-                                          <p:spTgt spid="36"/>
+                                          <p:spTgt spid="38"/>
                                         </p:tgtEl>
                                         <p:attrNameLst>
                                           <p:attrName>style.visibility</p:attrName>
@@ -9896,7 +9902,7 @@
                             </p:stCondLst>
                             <p:childTnLst>
                               <p:par>
-                                <p:cTn id="41" presetID="1" presetClass="entr" presetSubtype="0" fill="hold" grpId="0" nodeType="clickEffect">
+                                <p:cTn id="41" presetID="1" presetClass="entr" presetSubtype="0" fill="hold" nodeType="clickEffect">
                                   <p:stCondLst>
                                     <p:cond delay="0"/>
                                   </p:stCondLst>
@@ -9909,7 +9915,79 @@
                                           </p:stCondLst>
                                         </p:cTn>
                                         <p:tgtEl>
+                                          <p:spTgt spid="36"/>
+                                        </p:tgtEl>
+                                        <p:attrNameLst>
+                                          <p:attrName>style.visibility</p:attrName>
+                                        </p:attrNameLst>
+                                      </p:cBhvr>
+                                      <p:to>
+                                        <p:strVal val="visible"/>
+                                      </p:to>
+                                    </p:set>
+                                  </p:childTnLst>
+                                </p:cTn>
+                              </p:par>
+                            </p:childTnLst>
+                          </p:cTn>
+                        </p:par>
+                      </p:childTnLst>
+                    </p:cTn>
+                  </p:par>
+                  <p:par>
+                    <p:cTn id="43" fill="hold">
+                      <p:stCondLst>
+                        <p:cond delay="indefinite"/>
+                      </p:stCondLst>
+                      <p:childTnLst>
+                        <p:par>
+                          <p:cTn id="44" fill="hold">
+                            <p:stCondLst>
+                              <p:cond delay="0"/>
+                            </p:stCondLst>
+                            <p:childTnLst>
+                              <p:par>
+                                <p:cTn id="45" presetID="1" presetClass="entr" presetSubtype="0" fill="hold" grpId="0" nodeType="clickEffect">
+                                  <p:stCondLst>
+                                    <p:cond delay="0"/>
+                                  </p:stCondLst>
+                                  <p:childTnLst>
+                                    <p:set>
+                                      <p:cBhvr>
+                                        <p:cTn id="46" dur="1" fill="hold">
+                                          <p:stCondLst>
+                                            <p:cond delay="0"/>
+                                          </p:stCondLst>
+                                        </p:cTn>
+                                        <p:tgtEl>
                                           <p:spTgt spid="34"/>
+                                        </p:tgtEl>
+                                        <p:attrNameLst>
+                                          <p:attrName>style.visibility</p:attrName>
+                                        </p:attrNameLst>
+                                      </p:cBhvr>
+                                      <p:to>
+                                        <p:strVal val="visible"/>
+                                      </p:to>
+                                    </p:set>
+                                  </p:childTnLst>
+                                </p:cTn>
+                              </p:par>
+                              <p:par>
+                                <p:cTn id="47" presetID="1" presetClass="entr" presetSubtype="0" fill="hold" grpId="0" nodeType="withEffect">
+                                  <p:stCondLst>
+                                    <p:cond delay="0"/>
+                                  </p:stCondLst>
+                                  <p:childTnLst>
+                                    <p:set>
+                                      <p:cBhvr>
+                                        <p:cTn id="48" dur="1" fill="hold">
+                                          <p:stCondLst>
+                                            <p:cond delay="0"/>
+                                          </p:stCondLst>
+                                        </p:cTn>
+                                        <p:tgtEl>
+                                          <p:spTgt spid="45"/>
                                         </p:tgtEl>
                                         <p:attrNameLst>
                                           <p:attrName>style.visibility</p:attrName>
@@ -9953,6 +10031,9 @@
       <p:bldP spid="32" grpId="0" animBg="1"/>
       <p:bldP spid="33" grpId="0" animBg="1"/>
       <p:bldP spid="34" grpId="0" animBg="1"/>
+      <p:bldP spid="43" grpId="0"/>
+      <p:bldP spid="44" grpId="0"/>
+      <p:bldP spid="45" grpId="0"/>
     </p:bldLst>
   </p:timing>
 </p:sld>
@@ -10914,6 +10995,46 @@
                       </p:childTnLst>
                     </p:cTn>
                   </p:par>
+                  <p:par>
+                    <p:cTn id="27" fill="hold">
+                      <p:stCondLst>
+                        <p:cond delay="indefinite"/>
+                      </p:stCondLst>
+                      <p:childTnLst>
+                        <p:par>
+                          <p:cTn id="28" fill="hold">
+                            <p:stCondLst>
+                              <p:cond delay="0"/>
+                            </p:stCondLst>
+                            <p:childTnLst>
+                              <p:par>
+                                <p:cTn id="29" presetID="42" presetClass="path" presetSubtype="0" accel="50000" decel="50000" fill="hold" grpId="6" nodeType="clickEffect">
+                                  <p:stCondLst>
+                                    <p:cond delay="0"/>
+                                  </p:stCondLst>
+                                  <p:childTnLst>
+                                    <p:animMotion origin="layout" path="M 0.40338 0.3713 L 0.46575 0.73449 " pathEditMode="relative" rAng="0" ptsTypes="AA">
+                                      <p:cBhvr>
+                                        <p:cTn id="30" dur="1000" fill="hold"/>
+                                        <p:tgtEl>
+                                          <p:spTgt spid="8"/>
+                                        </p:tgtEl>
+                                        <p:attrNameLst>
+                                          <p:attrName>ppt_x</p:attrName>
+                                          <p:attrName>ppt_y</p:attrName>
+                                        </p:attrNameLst>
+                                      </p:cBhvr>
+                                      <p:rCtr x="3112" y="18148"/>
+                                    </p:animMotion>
+                                  </p:childTnLst>
+                                </p:cTn>
+                              </p:par>
+                            </p:childTnLst>
+                          </p:cTn>
+                        </p:par>
+                      </p:childTnLst>
+                    </p:cTn>
+                  </p:par>
                 </p:childTnLst>
               </p:cTn>
               <p:prevCondLst>
@@ -10942,6 +11063,7 @@
       <p:bldP spid="8" grpId="3" animBg="1"/>
       <p:bldP spid="8" grpId="4" animBg="1"/>
       <p:bldP spid="8" grpId="5" animBg="1"/>
+      <p:bldP spid="8" grpId="6" animBg="1"/>
     </p:bldLst>
   </p:timing>
 </p:sld>

</xml_diff>